<commit_message>
scratch notes and slides for rotation talk
</commit_message>
<xml_diff>
--- a/Summary/20210217_demo_for_ccgb_rotation_update.pptx
+++ b/Summary/20210217_demo_for_ccgb_rotation_update.pptx
@@ -240,7 +240,7 @@
           <a:p>
             <a:fld id="{2F446724-7A58-4020-9182-8374F0305DD3}" type="datetimeFigureOut">
               <a:rPr lang="en-US" smtClean="0"/>
-              <a:t>2/16/2021</a:t>
+              <a:t>2/17/2021</a:t>
             </a:fld>
             <a:endParaRPr lang="en-US"/>
           </a:p>
@@ -1074,7 +1074,7 @@
           <a:p>
             <a:fld id="{6A6E4237-9E27-40CF-A4D8-1330F92F21DA}" type="datetimeFigureOut">
               <a:rPr lang="en-US" smtClean="0"/>
-              <a:t>2/16/2021</a:t>
+              <a:t>2/17/2021</a:t>
             </a:fld>
             <a:endParaRPr lang="en-US"/>
           </a:p>
@@ -1272,7 +1272,7 @@
           <a:p>
             <a:fld id="{6A6E4237-9E27-40CF-A4D8-1330F92F21DA}" type="datetimeFigureOut">
               <a:rPr lang="en-US" smtClean="0"/>
-              <a:t>2/16/2021</a:t>
+              <a:t>2/17/2021</a:t>
             </a:fld>
             <a:endParaRPr lang="en-US"/>
           </a:p>
@@ -1480,7 +1480,7 @@
           <a:p>
             <a:fld id="{6A6E4237-9E27-40CF-A4D8-1330F92F21DA}" type="datetimeFigureOut">
               <a:rPr lang="en-US" smtClean="0"/>
-              <a:t>2/16/2021</a:t>
+              <a:t>2/17/2021</a:t>
             </a:fld>
             <a:endParaRPr lang="en-US"/>
           </a:p>
@@ -1678,7 +1678,7 @@
           <a:p>
             <a:fld id="{6A6E4237-9E27-40CF-A4D8-1330F92F21DA}" type="datetimeFigureOut">
               <a:rPr lang="en-US" smtClean="0"/>
-              <a:t>2/16/2021</a:t>
+              <a:t>2/17/2021</a:t>
             </a:fld>
             <a:endParaRPr lang="en-US"/>
           </a:p>
@@ -1953,7 +1953,7 @@
           <a:p>
             <a:fld id="{6A6E4237-9E27-40CF-A4D8-1330F92F21DA}" type="datetimeFigureOut">
               <a:rPr lang="en-US" smtClean="0"/>
-              <a:t>2/16/2021</a:t>
+              <a:t>2/17/2021</a:t>
             </a:fld>
             <a:endParaRPr lang="en-US"/>
           </a:p>
@@ -2218,7 +2218,7 @@
           <a:p>
             <a:fld id="{6A6E4237-9E27-40CF-A4D8-1330F92F21DA}" type="datetimeFigureOut">
               <a:rPr lang="en-US" smtClean="0"/>
-              <a:t>2/16/2021</a:t>
+              <a:t>2/17/2021</a:t>
             </a:fld>
             <a:endParaRPr lang="en-US"/>
           </a:p>
@@ -2630,7 +2630,7 @@
           <a:p>
             <a:fld id="{6A6E4237-9E27-40CF-A4D8-1330F92F21DA}" type="datetimeFigureOut">
               <a:rPr lang="en-US" smtClean="0"/>
-              <a:t>2/16/2021</a:t>
+              <a:t>2/17/2021</a:t>
             </a:fld>
             <a:endParaRPr lang="en-US"/>
           </a:p>
@@ -2771,7 +2771,7 @@
           <a:p>
             <a:fld id="{6A6E4237-9E27-40CF-A4D8-1330F92F21DA}" type="datetimeFigureOut">
               <a:rPr lang="en-US" smtClean="0"/>
-              <a:t>2/16/2021</a:t>
+              <a:t>2/17/2021</a:t>
             </a:fld>
             <a:endParaRPr lang="en-US"/>
           </a:p>
@@ -2884,7 +2884,7 @@
           <a:p>
             <a:fld id="{6A6E4237-9E27-40CF-A4D8-1330F92F21DA}" type="datetimeFigureOut">
               <a:rPr lang="en-US" smtClean="0"/>
-              <a:t>2/16/2021</a:t>
+              <a:t>2/17/2021</a:t>
             </a:fld>
             <a:endParaRPr lang="en-US"/>
           </a:p>
@@ -3195,7 +3195,7 @@
           <a:p>
             <a:fld id="{6A6E4237-9E27-40CF-A4D8-1330F92F21DA}" type="datetimeFigureOut">
               <a:rPr lang="en-US" smtClean="0"/>
-              <a:t>2/16/2021</a:t>
+              <a:t>2/17/2021</a:t>
             </a:fld>
             <a:endParaRPr lang="en-US"/>
           </a:p>
@@ -3483,7 +3483,7 @@
           <a:p>
             <a:fld id="{6A6E4237-9E27-40CF-A4D8-1330F92F21DA}" type="datetimeFigureOut">
               <a:rPr lang="en-US" smtClean="0"/>
-              <a:t>2/16/2021</a:t>
+              <a:t>2/17/2021</a:t>
             </a:fld>
             <a:endParaRPr lang="en-US"/>
           </a:p>
@@ -3724,7 +3724,7 @@
           <a:p>
             <a:fld id="{6A6E4237-9E27-40CF-A4D8-1330F92F21DA}" type="datetimeFigureOut">
               <a:rPr lang="en-US" smtClean="0"/>
-              <a:t>2/16/2021</a:t>
+              <a:t>2/17/2021</a:t>
             </a:fld>
             <a:endParaRPr lang="en-US"/>
           </a:p>
@@ -6013,7 +6013,7 @@
             <p:ph idx="1"/>
             <p:extLst>
               <p:ext uri="{D42A27DB-BD31-4B8C-83A1-F6EECF244321}">
-                <p14:modId xmlns:p14="http://schemas.microsoft.com/office/powerpoint/2010/main" val="2011150529"/>
+                <p14:modId xmlns:p14="http://schemas.microsoft.com/office/powerpoint/2010/main" val="1848870478"/>
               </p:ext>
             </p:extLst>
           </p:nvPr>
@@ -6156,16 +6156,23 @@
                     <a:bodyPr/>
                     <a:lstStyle/>
                     <a:p>
-                      <a:endParaRPr lang="en-US" dirty="0"/>
-                    </a:p>
-                  </a:txBody>
-                  <a:tcPr/>
-                </a:tc>
-                <a:tc>
-                  <a:txBody>
-                    <a:bodyPr/>
-                    <a:lstStyle/>
-                    <a:p>
+                      <a:r>
+                        <a:rPr lang="en-US" dirty="0"/>
+                        <a:t>-134.75824907</a:t>
+                      </a:r>
+                    </a:p>
+                  </a:txBody>
+                  <a:tcPr/>
+                </a:tc>
+                <a:tc>
+                  <a:txBody>
+                    <a:bodyPr/>
+                    <a:lstStyle/>
+                    <a:p>
+                      <a:r>
+                        <a:rPr lang="en-US" dirty="0"/>
+                        <a:t>-136.939167057</a:t>
+                      </a:r>
                       <a:endParaRPr lang="en-US" dirty="0">
                         <a:highlight>
                           <a:srgbClr val="FFFF00"/>
@@ -6180,6 +6187,10 @@
                     <a:bodyPr/>
                     <a:lstStyle/>
                     <a:p>
+                      <a:r>
+                        <a:rPr lang="en-US" dirty="0"/>
+                        <a:t>-134.758223864</a:t>
+                      </a:r>
                       <a:endParaRPr lang="en-US" dirty="0">
                         <a:highlight>
                           <a:srgbClr val="FFFF00"/>
@@ -6194,7 +6205,10 @@
                     <a:bodyPr/>
                     <a:lstStyle/>
                     <a:p>
-                      <a:endParaRPr lang="en-US" dirty="0"/>
+                      <a:r>
+                        <a:rPr lang="en-US" dirty="0"/>
+                        <a:t>-133.877889826</a:t>
+                      </a:r>
                     </a:p>
                   </a:txBody>
                   <a:tcPr/>
@@ -6225,37 +6239,49 @@
                     <a:bodyPr/>
                     <a:lstStyle/>
                     <a:p>
-                      <a:endParaRPr lang="en-US" dirty="0"/>
-                    </a:p>
-                  </a:txBody>
-                  <a:tcPr/>
-                </a:tc>
-                <a:tc>
-                  <a:txBody>
-                    <a:bodyPr/>
-                    <a:lstStyle/>
-                    <a:p>
-                      <a:endParaRPr lang="en-US" dirty="0"/>
-                    </a:p>
-                  </a:txBody>
-                  <a:tcPr/>
-                </a:tc>
-                <a:tc>
-                  <a:txBody>
-                    <a:bodyPr/>
-                    <a:lstStyle/>
-                    <a:p>
-                      <a:endParaRPr lang="en-US" dirty="0"/>
-                    </a:p>
-                  </a:txBody>
-                  <a:tcPr/>
-                </a:tc>
-                <a:tc>
-                  <a:txBody>
-                    <a:bodyPr/>
-                    <a:lstStyle/>
-                    <a:p>
-                      <a:endParaRPr lang="en-US" dirty="0"/>
+                      <a:r>
+                        <a:rPr lang="en-US" dirty="0"/>
+                        <a:t>5.52070018</a:t>
+                      </a:r>
+                    </a:p>
+                  </a:txBody>
+                  <a:tcPr/>
+                </a:tc>
+                <a:tc>
+                  <a:txBody>
+                    <a:bodyPr/>
+                    <a:lstStyle/>
+                    <a:p>
+                      <a:r>
+                        <a:rPr lang="en-US" dirty="0"/>
+                        <a:t>3.96928341</a:t>
+                      </a:r>
+                    </a:p>
+                  </a:txBody>
+                  <a:tcPr/>
+                </a:tc>
+                <a:tc>
+                  <a:txBody>
+                    <a:bodyPr/>
+                    <a:lstStyle/>
+                    <a:p>
+                      <a:r>
+                        <a:rPr lang="en-US" dirty="0"/>
+                        <a:t>1.00120516</a:t>
+                      </a:r>
+                    </a:p>
+                  </a:txBody>
+                  <a:tcPr/>
+                </a:tc>
+                <a:tc>
+                  <a:txBody>
+                    <a:bodyPr/>
+                    <a:lstStyle/>
+                    <a:p>
+                      <a:r>
+                        <a:rPr lang="en-US" dirty="0"/>
+                        <a:t>1.69793265</a:t>
+                      </a:r>
                     </a:p>
                   </a:txBody>
                   <a:tcPr/>
@@ -6312,17 +6338,23 @@
                     <a:bodyPr/>
                     <a:lstStyle/>
                     <a:p>
-                      <a:endParaRPr lang="en-US" dirty="0"/>
-                    </a:p>
-                  </a:txBody>
-                  <a:tcPr/>
-                </a:tc>
-                <a:tc>
-                  <a:txBody>
-                    <a:bodyPr/>
-                    <a:lstStyle/>
-                    <a:p>
-                      <a:endParaRPr lang="en-US" dirty="0"/>
+                      <a:r>
+                        <a:rPr lang="en-US" dirty="0"/>
+                        <a:t>5.52035461</a:t>
+                      </a:r>
+                    </a:p>
+                  </a:txBody>
+                  <a:tcPr/>
+                </a:tc>
+                <a:tc>
+                  <a:txBody>
+                    <a:bodyPr/>
+                    <a:lstStyle/>
+                    <a:p>
+                      <a:r>
+                        <a:rPr lang="en-US" dirty="0"/>
+                        <a:t>4.91266537</a:t>
+                      </a:r>
                     </a:p>
                   </a:txBody>
                   <a:tcPr/>
@@ -6352,37 +6384,49 @@
                     <a:bodyPr/>
                     <a:lstStyle/>
                     <a:p>
-                      <a:endParaRPr lang="en-US" dirty="0"/>
-                    </a:p>
-                  </a:txBody>
-                  <a:tcPr/>
-                </a:tc>
-                <a:tc>
-                  <a:txBody>
-                    <a:bodyPr/>
-                    <a:lstStyle/>
-                    <a:p>
-                      <a:endParaRPr lang="en-US" dirty="0"/>
-                    </a:p>
-                  </a:txBody>
-                  <a:tcPr/>
-                </a:tc>
-                <a:tc>
-                  <a:txBody>
-                    <a:bodyPr/>
-                    <a:lstStyle/>
-                    <a:p>
-                      <a:endParaRPr lang="en-US" dirty="0"/>
-                    </a:p>
-                  </a:txBody>
-                  <a:tcPr/>
-                </a:tc>
-                <a:tc>
-                  <a:txBody>
-                    <a:bodyPr/>
-                    <a:lstStyle/>
-                    <a:p>
-                      <a:endParaRPr lang="en-US" dirty="0"/>
+                      <a:r>
+                        <a:rPr lang="en-US" dirty="0"/>
+                        <a:t>0.65275521</a:t>
+                      </a:r>
+                    </a:p>
+                  </a:txBody>
+                  <a:tcPr/>
+                </a:tc>
+                <a:tc>
+                  <a:txBody>
+                    <a:bodyPr/>
+                    <a:lstStyle/>
+                    <a:p>
+                      <a:r>
+                        <a:rPr lang="en-US" dirty="0"/>
+                        <a:t>0.3955718</a:t>
+                      </a:r>
+                    </a:p>
+                  </a:txBody>
+                  <a:tcPr/>
+                </a:tc>
+                <a:tc>
+                  <a:txBody>
+                    <a:bodyPr/>
+                    <a:lstStyle/>
+                    <a:p>
+                      <a:r>
+                        <a:rPr lang="en-US" dirty="0"/>
+                        <a:t>0.65317188</a:t>
+                      </a:r>
+                    </a:p>
+                  </a:txBody>
+                  <a:tcPr/>
+                </a:tc>
+                <a:tc>
+                  <a:txBody>
+                    <a:bodyPr/>
+                    <a:lstStyle/>
+                    <a:p>
+                      <a:r>
+                        <a:rPr lang="en-US" dirty="0"/>
+                        <a:t>0.46533747</a:t>
+                      </a:r>
                     </a:p>
                   </a:txBody>
                   <a:tcPr/>
@@ -6451,7 +6495,10 @@
                     <a:bodyPr/>
                     <a:lstStyle/>
                     <a:p>
-                      <a:endParaRPr lang="en-US" dirty="0"/>
+                      <a:r>
+                        <a:rPr lang="en-US" dirty="0"/>
+                        <a:t>0.27208794</a:t>
+                      </a:r>
                     </a:p>
                   </a:txBody>
                   <a:tcPr/>
@@ -7461,7 +7508,7 @@
             <p:ph idx="1"/>
             <p:extLst>
               <p:ext uri="{D42A27DB-BD31-4B8C-83A1-F6EECF244321}">
-                <p14:modId xmlns:p14="http://schemas.microsoft.com/office/powerpoint/2010/main" val="2954193161"/>
+                <p14:modId xmlns:p14="http://schemas.microsoft.com/office/powerpoint/2010/main" val="262392616"/>
               </p:ext>
             </p:extLst>
           </p:nvPr>
@@ -8239,7 +8286,7 @@
             <p:ph idx="1"/>
             <p:extLst>
               <p:ext uri="{D42A27DB-BD31-4B8C-83A1-F6EECF244321}">
-                <p14:modId xmlns:p14="http://schemas.microsoft.com/office/powerpoint/2010/main" val="1991837065"/>
+                <p14:modId xmlns:p14="http://schemas.microsoft.com/office/powerpoint/2010/main" val="4047319796"/>
               </p:ext>
             </p:extLst>
           </p:nvPr>
@@ -8431,7 +8478,10 @@
                     <a:bodyPr/>
                     <a:lstStyle/>
                     <a:p>
-                      <a:endParaRPr lang="en-US" dirty="0"/>
+                      <a:r>
+                        <a:rPr lang="en-US" dirty="0"/>
+                        <a:t>-25.7139166244</a:t>
+                      </a:r>
                     </a:p>
                   </a:txBody>
                   <a:tcPr/>
@@ -8501,7 +8551,10 @@
                     <a:bodyPr/>
                     <a:lstStyle/>
                     <a:p>
-                      <a:endParaRPr lang="en-US" dirty="0"/>
+                      <a:r>
+                        <a:rPr lang="en-US" dirty="0"/>
+                        <a:t>24.06635808</a:t>
+                      </a:r>
                     </a:p>
                   </a:txBody>
                   <a:tcPr/>
@@ -8571,7 +8624,10 @@
                     <a:bodyPr/>
                     <a:lstStyle/>
                     <a:p>
-                      <a:endParaRPr lang="en-US" dirty="0"/>
+                      <a:r>
+                        <a:rPr lang="en-US" dirty="0"/>
+                        <a:t>4.63164974</a:t>
+                      </a:r>
                     </a:p>
                   </a:txBody>
                   <a:tcPr/>
@@ -8640,7 +8696,10 @@
                     <a:bodyPr/>
                     <a:lstStyle/>
                     <a:p>
-                      <a:endParaRPr lang="en-US" dirty="0"/>
+                      <a:r>
+                        <a:rPr lang="en-US" dirty="0"/>
+                        <a:t>4.14974652</a:t>
+                      </a:r>
                     </a:p>
                   </a:txBody>
                   <a:tcPr/>
@@ -8709,7 +8768,10 @@
                     <a:bodyPr/>
                     <a:lstStyle/>
                     <a:p>
-                      <a:endParaRPr lang="en-US" dirty="0"/>
+                      <a:r>
+                        <a:rPr lang="en-US" dirty="0"/>
+                        <a:t>1.32298356</a:t>
+                      </a:r>
                     </a:p>
                   </a:txBody>
                   <a:tcPr/>
@@ -10064,7 +10126,7 @@
             <p:ph idx="1"/>
             <p:extLst>
               <p:ext uri="{D42A27DB-BD31-4B8C-83A1-F6EECF244321}">
-                <p14:modId xmlns:p14="http://schemas.microsoft.com/office/powerpoint/2010/main" val="626195314"/>
+                <p14:modId xmlns:p14="http://schemas.microsoft.com/office/powerpoint/2010/main" val="2376324388"/>
               </p:ext>
             </p:extLst>
           </p:nvPr>
@@ -10256,7 +10318,10 @@
                     <a:bodyPr/>
                     <a:lstStyle/>
                     <a:p>
-                      <a:endParaRPr lang="en-US" dirty="0"/>
+                      <a:r>
+                        <a:rPr lang="en-US" dirty="0"/>
+                        <a:t>-121.995339345</a:t>
+                      </a:r>
                     </a:p>
                   </a:txBody>
                   <a:tcPr/>
@@ -10326,7 +10391,10 @@
                     <a:bodyPr/>
                     <a:lstStyle/>
                     <a:p>
-                      <a:endParaRPr lang="en-US" dirty="0"/>
+                      <a:r>
+                        <a:rPr lang="en-US" dirty="0"/>
+                        <a:t>2.64925027</a:t>
+                      </a:r>
                     </a:p>
                   </a:txBody>
                   <a:tcPr/>
@@ -10396,7 +10464,10 @@
                     <a:bodyPr/>
                     <a:lstStyle/>
                     <a:p>
-                      <a:endParaRPr lang="en-US" dirty="0"/>
+                      <a:r>
+                        <a:rPr lang="en-US" dirty="0"/>
+                        <a:t>1.49440752</a:t>
+                      </a:r>
                     </a:p>
                   </a:txBody>
                   <a:tcPr/>
@@ -10465,7 +10536,10 @@
                     <a:bodyPr/>
                     <a:lstStyle/>
                     <a:p>
-                      <a:endParaRPr lang="en-US" dirty="0"/>
+                      <a:r>
+                        <a:rPr lang="en-US" dirty="0"/>
+                        <a:t>0.00631432</a:t>
+                      </a:r>
                     </a:p>
                   </a:txBody>
                   <a:tcPr/>
@@ -10534,7 +10608,10 @@
                     <a:bodyPr/>
                     <a:lstStyle/>
                     <a:p>
-                      <a:endParaRPr lang="en-US" dirty="0"/>
+                      <a:r>
+                        <a:rPr lang="en-US" dirty="0"/>
+                        <a:t>0.43254745</a:t>
+                      </a:r>
                     </a:p>
                   </a:txBody>
                   <a:tcPr/>
@@ -10751,7 +10828,7 @@
             <p:ph idx="1"/>
             <p:extLst>
               <p:ext uri="{D42A27DB-BD31-4B8C-83A1-F6EECF244321}">
-                <p14:modId xmlns:p14="http://schemas.microsoft.com/office/powerpoint/2010/main" val="2905816402"/>
+                <p14:modId xmlns:p14="http://schemas.microsoft.com/office/powerpoint/2010/main" val="151831902"/>
               </p:ext>
             </p:extLst>
           </p:nvPr>
@@ -10943,7 +11020,10 @@
                     <a:bodyPr/>
                     <a:lstStyle/>
                     <a:p>
-                      <a:endParaRPr lang="en-US" dirty="0"/>
+                      <a:r>
+                        <a:rPr lang="en-US" dirty="0"/>
+                        <a:t>-141.148031575</a:t>
+                      </a:r>
                     </a:p>
                   </a:txBody>
                   <a:tcPr/>
@@ -11013,7 +11093,10 @@
                     <a:bodyPr/>
                     <a:lstStyle/>
                     <a:p>
-                      <a:endParaRPr lang="en-US" dirty="0"/>
+                      <a:r>
+                        <a:rPr lang="en-US" dirty="0"/>
+                        <a:t>3.24358033</a:t>
+                      </a:r>
                     </a:p>
                   </a:txBody>
                   <a:tcPr/>
@@ -11083,7 +11166,10 @@
                     <a:bodyPr/>
                     <a:lstStyle/>
                     <a:p>
-                      <a:endParaRPr lang="en-US" dirty="0"/>
+                      <a:r>
+                        <a:rPr lang="en-US" dirty="0"/>
+                        <a:t>1.73262388</a:t>
+                      </a:r>
                     </a:p>
                   </a:txBody>
                   <a:tcPr/>
@@ -11152,7 +11238,10 @@
                     <a:bodyPr/>
                     <a:lstStyle/>
                     <a:p>
-                      <a:endParaRPr lang="en-US" dirty="0"/>
+                      <a:r>
+                        <a:rPr lang="en-US" dirty="0"/>
+                        <a:t>0.40179331</a:t>
+                      </a:r>
                     </a:p>
                   </a:txBody>
                   <a:tcPr/>
@@ -11221,7 +11310,10 @@
                     <a:bodyPr/>
                     <a:lstStyle/>
                     <a:p>
-                      <a:endParaRPr lang="en-US" dirty="0"/>
+                      <a:r>
+                        <a:rPr lang="en-US" dirty="0"/>
+                        <a:t>0.54790132</a:t>
+                      </a:r>
                     </a:p>
                   </a:txBody>
                   <a:tcPr/>

</xml_diff>